<commit_message>
just the end results to go now
</commit_message>
<xml_diff>
--- a/sizes.pptx
+++ b/sizes.pptx
@@ -3103,7 +3103,7 @@
         </p:nvSpPr>
         <p:spPr>
           <a:xfrm>
-            <a:off x="981685" y="715209"/>
+            <a:off x="1057888" y="766011"/>
             <a:ext cx="740664" cy="740664"/>
           </a:xfrm>
           <a:prstGeom prst="ellipse">
@@ -3149,14 +3149,14 @@
         </p:nvSpPr>
         <p:spPr>
           <a:xfrm>
-            <a:off x="1401668" y="827299"/>
+            <a:off x="1418602" y="1098243"/>
             <a:ext cx="292608" cy="292608"/>
           </a:xfrm>
           <a:prstGeom prst="ellipse">
             <a:avLst/>
           </a:prstGeom>
           <a:solidFill>
-            <a:srgbClr val="E46C0A"/>
+            <a:schemeClr val="bg1"/>
           </a:solidFill>
           <a:ln>
             <a:noFill/>
@@ -3193,14 +3193,16 @@
         </p:nvSpPr>
         <p:spPr>
           <a:xfrm>
-            <a:off x="1921213" y="1063957"/>
+            <a:off x="1921213" y="979287"/>
             <a:ext cx="448056" cy="420624"/>
           </a:xfrm>
           <a:prstGeom prst="ellipse">
             <a:avLst/>
           </a:prstGeom>
           <a:solidFill>
-            <a:srgbClr val="E46C0A"/>
+            <a:schemeClr val="bg1">
+              <a:lumMod val="65000"/>
+            </a:schemeClr>
           </a:solidFill>
           <a:ln>
             <a:noFill/>
@@ -3241,14 +3243,16 @@
         </p:nvSpPr>
         <p:spPr>
           <a:xfrm>
-            <a:off x="2509551" y="1048218"/>
+            <a:off x="2509551" y="963548"/>
             <a:ext cx="448056" cy="420624"/>
           </a:xfrm>
           <a:prstGeom prst="ellipse">
             <a:avLst/>
           </a:prstGeom>
           <a:solidFill>
-            <a:srgbClr val="E46C0A"/>
+            <a:schemeClr val="bg1">
+              <a:lumMod val="65000"/>
+            </a:schemeClr>
           </a:solidFill>
           <a:ln>
             <a:noFill/>
@@ -3285,14 +3289,16 @@
         </p:nvSpPr>
         <p:spPr>
           <a:xfrm>
-            <a:off x="3280687" y="1326041"/>
-            <a:ext cx="137160" cy="137160"/>
+            <a:off x="3170616" y="1207503"/>
+            <a:ext cx="73152" cy="73152"/>
           </a:xfrm>
           <a:prstGeom prst="ellipse">
             <a:avLst/>
           </a:prstGeom>
           <a:solidFill>
-            <a:srgbClr val="E46C0A"/>
+            <a:schemeClr val="bg1">
+              <a:lumMod val="65000"/>
+            </a:schemeClr>
           </a:solidFill>
           <a:ln>
             <a:noFill/>
@@ -3323,13 +3329,43 @@
       </p:sp>
       <p:sp>
         <p:nvSpPr>
+          <p:cNvPr id="9" name="TextBox 8"/>
+          <p:cNvSpPr txBox="1"/>
+          <p:nvPr/>
+        </p:nvSpPr>
+        <p:spPr>
+          <a:xfrm>
+            <a:off x="1073624" y="821244"/>
+            <a:ext cx="671979" cy="246221"/>
+          </a:xfrm>
+          <a:prstGeom prst="rect">
+            <a:avLst/>
+          </a:prstGeom>
+          <a:noFill/>
+        </p:spPr>
+        <p:txBody>
+          <a:bodyPr wrap="none" rtlCol="0">
+            <a:spAutoFit/>
+          </a:bodyPr>
+          <a:lstStyle/>
+          <a:p>
+            <a:r>
+              <a:rPr lang="en-US" sz="1000" dirty="0" smtClean="0"/>
+              <a:t>Coc’2000</a:t>
+            </a:r>
+            <a:endParaRPr lang="en-US" sz="1000" dirty="0"/>
+          </a:p>
+        </p:txBody>
+      </p:sp>
+      <p:sp>
+        <p:nvSpPr>
           <p:cNvPr id="10" name="TextBox 9"/>
           <p:cNvSpPr txBox="1"/>
           <p:nvPr/>
         </p:nvSpPr>
         <p:spPr>
           <a:xfrm>
-            <a:off x="1332083" y="759145"/>
+            <a:off x="1355183" y="1037773"/>
             <a:ext cx="429929" cy="400110"/>
           </a:xfrm>
           <a:prstGeom prst="rect">
@@ -3345,53 +3381,8 @@
           <a:p>
             <a:pPr algn="ctr"/>
             <a:r>
-              <a:rPr lang="en-US" sz="1000" dirty="0" smtClean="0">
-                <a:solidFill>
-                  <a:schemeClr val="bg1"/>
-                </a:solidFill>
-              </a:rPr>
+              <a:rPr lang="en-US" sz="1000" dirty="0" smtClean="0"/>
               <a:t>Coc ‘81</a:t>
-            </a:r>
-            <a:endParaRPr lang="en-US" sz="1000" dirty="0">
-              <a:solidFill>
-                <a:schemeClr val="bg1"/>
-              </a:solidFill>
-            </a:endParaRPr>
-          </a:p>
-        </p:txBody>
-      </p:sp>
-      <p:sp>
-        <p:nvSpPr>
-          <p:cNvPr id="9" name="TextBox 8"/>
-          <p:cNvSpPr txBox="1"/>
-          <p:nvPr/>
-        </p:nvSpPr>
-        <p:spPr>
-          <a:xfrm>
-            <a:off x="973218" y="870616"/>
-            <a:ext cx="479618" cy="400110"/>
-          </a:xfrm>
-          <a:prstGeom prst="rect">
-            <a:avLst/>
-          </a:prstGeom>
-          <a:noFill/>
-        </p:spPr>
-        <p:txBody>
-          <a:bodyPr wrap="none" rtlCol="0">
-            <a:spAutoFit/>
-          </a:bodyPr>
-          <a:lstStyle/>
-          <a:p>
-            <a:r>
-              <a:rPr lang="en-US" sz="1000" dirty="0" smtClean="0"/>
-              <a:t>Coc</a:t>
-            </a:r>
-            <a:br>
-              <a:rPr lang="en-US" sz="1000" dirty="0" smtClean="0"/>
-            </a:br>
-            <a:r>
-              <a:rPr lang="en-US" sz="1000" dirty="0" smtClean="0"/>
-              <a:t>’2000</a:t>
             </a:r>
             <a:endParaRPr lang="en-US" sz="1000" dirty="0"/>
           </a:p>
@@ -3405,7 +3396,7 @@
         </p:nvSpPr>
         <p:spPr>
           <a:xfrm>
-            <a:off x="1901488" y="1077199"/>
+            <a:off x="1942251" y="986007"/>
             <a:ext cx="440458" cy="400110"/>
           </a:xfrm>
           <a:prstGeom prst="rect">
@@ -3421,29 +3412,17 @@
           <a:p>
             <a:pPr algn="ctr"/>
             <a:r>
-              <a:rPr lang="en-US" sz="1000" dirty="0" smtClean="0">
-                <a:solidFill>
-                  <a:schemeClr val="bg1"/>
-                </a:solidFill>
-              </a:rPr>
+              <a:rPr lang="en-US" sz="1000" dirty="0" smtClean="0"/>
               <a:t>Nasa </a:t>
             </a:r>
           </a:p>
           <a:p>
             <a:pPr algn="ctr"/>
             <a:r>
-              <a:rPr lang="en-US" sz="1000" dirty="0" smtClean="0">
-                <a:solidFill>
-                  <a:schemeClr val="bg1"/>
-                </a:solidFill>
-              </a:rPr>
+              <a:rPr lang="en-US" sz="1000" dirty="0" smtClean="0"/>
               <a:t>‘93</a:t>
             </a:r>
-            <a:endParaRPr lang="en-US" sz="1000" dirty="0">
-              <a:solidFill>
-                <a:schemeClr val="bg1"/>
-              </a:solidFill>
-            </a:endParaRPr>
+            <a:endParaRPr lang="en-US" sz="1000" dirty="0"/>
           </a:p>
         </p:txBody>
       </p:sp>
@@ -3455,7 +3434,7 @@
         </p:nvSpPr>
         <p:spPr>
           <a:xfrm>
-            <a:off x="2130184" y="1289314"/>
+            <a:off x="2130184" y="1390918"/>
             <a:ext cx="184666" cy="369332"/>
           </a:xfrm>
           <a:prstGeom prst="rect">
@@ -3481,7 +3460,7 @@
         </p:nvSpPr>
         <p:spPr>
           <a:xfrm>
-            <a:off x="2473780" y="1048218"/>
+            <a:off x="2473780" y="963548"/>
             <a:ext cx="483827" cy="400110"/>
           </a:xfrm>
           <a:prstGeom prst="rect">
@@ -3497,18 +3476,10 @@
           <a:p>
             <a:pPr algn="ctr"/>
             <a:r>
-              <a:rPr lang="en-US" sz="1000" dirty="0" smtClean="0">
-                <a:solidFill>
-                  <a:schemeClr val="bg1"/>
-                </a:solidFill>
-              </a:rPr>
+              <a:rPr lang="en-US" sz="1000" dirty="0" smtClean="0"/>
               <a:t>Coc ‘05</a:t>
             </a:r>
-            <a:endParaRPr lang="en-US" sz="1000" dirty="0">
-              <a:solidFill>
-                <a:schemeClr val="bg1"/>
-              </a:solidFill>
-            </a:endParaRPr>
+            <a:endParaRPr lang="en-US" sz="1000" dirty="0"/>
           </a:p>
         </p:txBody>
       </p:sp>
@@ -3520,7 +3491,7 @@
         </p:nvSpPr>
         <p:spPr>
           <a:xfrm>
-            <a:off x="3189238" y="1251714"/>
+            <a:off x="2896600" y="779513"/>
             <a:ext cx="941245" cy="246221"/>
           </a:xfrm>
           <a:prstGeom prst="rect">
@@ -3543,248 +3514,16 @@
           </a:p>
         </p:txBody>
       </p:sp>
-      <p:sp>
-        <p:nvSpPr>
-          <p:cNvPr id="21" name="TextBox 20"/>
-          <p:cNvSpPr txBox="1"/>
-          <p:nvPr/>
-        </p:nvSpPr>
-        <p:spPr>
-          <a:xfrm>
-            <a:off x="618405" y="1530291"/>
-            <a:ext cx="1333892" cy="343684"/>
-          </a:xfrm>
-          <a:prstGeom prst="rect">
-            <a:avLst/>
-          </a:prstGeom>
-          <a:noFill/>
-        </p:spPr>
-        <p:txBody>
-          <a:bodyPr wrap="square" rtlCol="0">
-            <a:spAutoFit/>
-          </a:bodyPr>
-          <a:lstStyle/>
-          <a:p>
-            <a:pPr>
-              <a:lnSpc>
-                <a:spcPct val="80000"/>
-              </a:lnSpc>
-            </a:pPr>
-            <a:r>
-              <a:rPr lang="en-US" sz="1000" i="1" dirty="0" smtClean="0"/>
-              <a:t>161  </a:t>
-            </a:r>
-          </a:p>
-          <a:p>
-            <a:pPr>
-              <a:lnSpc>
-                <a:spcPct val="80000"/>
-              </a:lnSpc>
-            </a:pPr>
-            <a:r>
-              <a:rPr lang="en-US" sz="1000" i="1" dirty="0" smtClean="0"/>
-              <a:t>projects</a:t>
-            </a:r>
-            <a:endParaRPr lang="en-US" sz="1000" i="1" dirty="0"/>
-          </a:p>
-        </p:txBody>
-      </p:sp>
-      <p:sp>
-        <p:nvSpPr>
-          <p:cNvPr id="22" name="TextBox 21"/>
-          <p:cNvSpPr txBox="1"/>
-          <p:nvPr/>
-        </p:nvSpPr>
-        <p:spPr>
-          <a:xfrm>
-            <a:off x="1253103" y="1544072"/>
-            <a:ext cx="626461" cy="343684"/>
-          </a:xfrm>
-          <a:prstGeom prst="rect">
-            <a:avLst/>
-          </a:prstGeom>
-          <a:noFill/>
-        </p:spPr>
-        <p:txBody>
-          <a:bodyPr wrap="square" rtlCol="0">
-            <a:spAutoFit/>
-          </a:bodyPr>
-          <a:lstStyle/>
-          <a:p>
-            <a:pPr algn="r">
-              <a:lnSpc>
-                <a:spcPct val="80000"/>
-              </a:lnSpc>
-            </a:pPr>
-            <a:r>
-              <a:rPr lang="en-US" sz="1000" i="1" dirty="0" smtClean="0"/>
-              <a:t>62 </a:t>
-            </a:r>
-          </a:p>
-          <a:p>
-            <a:pPr algn="ctr">
-              <a:lnSpc>
-                <a:spcPct val="80000"/>
-              </a:lnSpc>
-            </a:pPr>
-            <a:r>
-              <a:rPr lang="en-US" sz="1000" i="1" dirty="0" smtClean="0"/>
-              <a:t> projects</a:t>
-            </a:r>
-            <a:endParaRPr lang="en-US" sz="1000" i="1" dirty="0"/>
-          </a:p>
-        </p:txBody>
-      </p:sp>
-      <p:sp>
-        <p:nvSpPr>
-          <p:cNvPr id="23" name="TextBox 22"/>
-          <p:cNvSpPr txBox="1"/>
-          <p:nvPr/>
-        </p:nvSpPr>
-        <p:spPr>
-          <a:xfrm>
-            <a:off x="1990739" y="1537715"/>
-            <a:ext cx="631879" cy="343684"/>
-          </a:xfrm>
-          <a:prstGeom prst="rect">
-            <a:avLst/>
-          </a:prstGeom>
-          <a:noFill/>
-        </p:spPr>
-        <p:txBody>
-          <a:bodyPr wrap="none" rtlCol="0">
-            <a:spAutoFit/>
-          </a:bodyPr>
-          <a:lstStyle/>
-          <a:p>
-            <a:pPr>
-              <a:lnSpc>
-                <a:spcPct val="80000"/>
-              </a:lnSpc>
-            </a:pPr>
-            <a:r>
-              <a:rPr lang="en-US" sz="1000" i="1" dirty="0" smtClean="0"/>
-              <a:t>92</a:t>
-            </a:r>
-          </a:p>
-          <a:p>
-            <a:pPr>
-              <a:lnSpc>
-                <a:spcPct val="80000"/>
-              </a:lnSpc>
-            </a:pPr>
-            <a:r>
-              <a:rPr lang="en-US" sz="1000" i="1" dirty="0" smtClean="0"/>
-              <a:t>projects</a:t>
-            </a:r>
-            <a:endParaRPr lang="en-US" sz="1000" i="1" dirty="0"/>
-          </a:p>
-        </p:txBody>
-      </p:sp>
-      <p:sp>
-        <p:nvSpPr>
-          <p:cNvPr id="24" name="TextBox 23"/>
-          <p:cNvSpPr txBox="1"/>
-          <p:nvPr/>
-        </p:nvSpPr>
-        <p:spPr>
-          <a:xfrm>
-            <a:off x="2583877" y="1545497"/>
-            <a:ext cx="631879" cy="343684"/>
-          </a:xfrm>
-          <a:prstGeom prst="rect">
-            <a:avLst/>
-          </a:prstGeom>
-          <a:noFill/>
-        </p:spPr>
-        <p:txBody>
-          <a:bodyPr wrap="none" rtlCol="0">
-            <a:spAutoFit/>
-          </a:bodyPr>
-          <a:lstStyle/>
-          <a:p>
-            <a:pPr>
-              <a:lnSpc>
-                <a:spcPct val="80000"/>
-              </a:lnSpc>
-            </a:pPr>
-            <a:r>
-              <a:rPr lang="en-US" sz="1000" i="1" dirty="0" smtClean="0"/>
-              <a:t>93</a:t>
-            </a:r>
-          </a:p>
-          <a:p>
-            <a:pPr>
-              <a:lnSpc>
-                <a:spcPct val="80000"/>
-              </a:lnSpc>
-            </a:pPr>
-            <a:r>
-              <a:rPr lang="en-US" sz="1000" i="1" dirty="0" smtClean="0"/>
-              <a:t>projects</a:t>
-            </a:r>
-            <a:endParaRPr lang="en-US" sz="1000" i="1" dirty="0"/>
-          </a:p>
-        </p:txBody>
-      </p:sp>
-      <p:sp>
-        <p:nvSpPr>
-          <p:cNvPr id="25" name="TextBox 24"/>
-          <p:cNvSpPr txBox="1"/>
-          <p:nvPr/>
-        </p:nvSpPr>
-        <p:spPr>
-          <a:xfrm>
-            <a:off x="3205076" y="1542872"/>
-            <a:ext cx="631879" cy="343684"/>
-          </a:xfrm>
-          <a:prstGeom prst="rect">
-            <a:avLst/>
-          </a:prstGeom>
-          <a:noFill/>
-        </p:spPr>
-        <p:txBody>
-          <a:bodyPr wrap="none" rtlCol="0">
-            <a:spAutoFit/>
-          </a:bodyPr>
-          <a:lstStyle/>
-          <a:p>
-            <a:pPr>
-              <a:lnSpc>
-                <a:spcPct val="80000"/>
-              </a:lnSpc>
-            </a:pPr>
-            <a:r>
-              <a:rPr lang="en-US" sz="1000" i="1" dirty="0" smtClean="0"/>
-              <a:t>17</a:t>
-            </a:r>
-          </a:p>
-          <a:p>
-            <a:pPr>
-              <a:lnSpc>
-                <a:spcPct val="80000"/>
-              </a:lnSpc>
-            </a:pPr>
-            <a:r>
-              <a:rPr lang="en-US" sz="1000" i="1" dirty="0" smtClean="0"/>
-              <a:t>projects</a:t>
-            </a:r>
-            <a:endParaRPr lang="en-US" sz="1000" i="1" dirty="0"/>
-          </a:p>
-        </p:txBody>
-      </p:sp>
       <p:cxnSp>
         <p:nvCxnSpPr>
-          <p:cNvPr id="26" name="Straight Connector 25"/>
-          <p:cNvCxnSpPr>
-            <a:endCxn id="10" idx="2"/>
-          </p:cNvCxnSpPr>
+          <p:cNvPr id="16" name="Straight Connector 15"/>
+          <p:cNvCxnSpPr/>
           <p:nvPr/>
         </p:nvCxnSpPr>
         <p:spPr>
-          <a:xfrm flipH="1" flipV="1">
-            <a:off x="1547048" y="1159255"/>
-            <a:ext cx="137820" cy="415546"/>
+          <a:xfrm>
+            <a:off x="3199400" y="986007"/>
+            <a:ext cx="0" cy="167507"/>
           </a:xfrm>
           <a:prstGeom prst="line">
             <a:avLst/>
@@ -3794,329 +3533,7 @@
               <a:schemeClr val="tx1"/>
             </a:solidFill>
             <a:headEnd type="none"/>
-            <a:tailEnd type="stealth"/>
-          </a:ln>
-        </p:spPr>
-        <p:style>
-          <a:lnRef idx="2">
-            <a:schemeClr val="accent1"/>
-          </a:lnRef>
-          <a:fillRef idx="0">
-            <a:schemeClr val="accent1"/>
-          </a:fillRef>
-          <a:effectRef idx="1">
-            <a:schemeClr val="accent1"/>
-          </a:effectRef>
-          <a:fontRef idx="minor">
-            <a:schemeClr val="tx1"/>
-          </a:fontRef>
-        </p:style>
-      </p:cxnSp>
-      <p:sp>
-        <p:nvSpPr>
-          <p:cNvPr id="42" name="TextBox 41"/>
-          <p:cNvSpPr txBox="1"/>
-          <p:nvPr/>
-        </p:nvSpPr>
-        <p:spPr>
-          <a:xfrm>
-            <a:off x="2755972" y="340497"/>
-            <a:ext cx="1130225" cy="553998"/>
-          </a:xfrm>
-          <a:prstGeom prst="rect">
-            <a:avLst/>
-          </a:prstGeom>
-          <a:noFill/>
-        </p:spPr>
-        <p:txBody>
-          <a:bodyPr wrap="square" rtlCol="0">
-            <a:spAutoFit/>
-          </a:bodyPr>
-          <a:lstStyle/>
-          <a:p>
-            <a:r>
-              <a:rPr lang="en-US" sz="1000" dirty="0" smtClean="0"/>
-              <a:t>Data used by </a:t>
-            </a:r>
-          </a:p>
-          <a:p>
-            <a:r>
-              <a:rPr lang="en-US" sz="1000" dirty="0" smtClean="0"/>
-              <a:t>learners of this    </a:t>
-            </a:r>
-          </a:p>
-          <a:p>
-            <a:r>
-              <a:rPr lang="en-US" sz="1000" dirty="0"/>
-              <a:t> </a:t>
-            </a:r>
-            <a:r>
-              <a:rPr lang="en-US" sz="1000" dirty="0" smtClean="0"/>
-              <a:t>          study</a:t>
-            </a:r>
-            <a:endParaRPr lang="en-US" sz="1000" dirty="0"/>
-          </a:p>
-        </p:txBody>
-      </p:sp>
-      <p:cxnSp>
-        <p:nvCxnSpPr>
-          <p:cNvPr id="45" name="Straight Arrow Connector 44"/>
-          <p:cNvCxnSpPr/>
-          <p:nvPr/>
-        </p:nvCxnSpPr>
-        <p:spPr>
-          <a:xfrm flipH="1">
-            <a:off x="1617133" y="750559"/>
-            <a:ext cx="1452472" cy="231574"/>
-          </a:xfrm>
-          <a:prstGeom prst="straightConnector1">
-            <a:avLst/>
-          </a:prstGeom>
-          <a:ln w="3175" cmpd="sng">
-            <a:solidFill>
-              <a:schemeClr val="tx1"/>
-            </a:solidFill>
-            <a:headEnd type="none"/>
-            <a:tailEnd type="none"/>
-          </a:ln>
-        </p:spPr>
-        <p:style>
-          <a:lnRef idx="2">
-            <a:schemeClr val="accent1"/>
-          </a:lnRef>
-          <a:fillRef idx="0">
-            <a:schemeClr val="accent1"/>
-          </a:fillRef>
-          <a:effectRef idx="1">
-            <a:schemeClr val="accent1"/>
-          </a:effectRef>
-          <a:fontRef idx="minor">
-            <a:schemeClr val="tx1"/>
-          </a:fontRef>
-        </p:style>
-      </p:cxnSp>
-      <p:cxnSp>
-        <p:nvCxnSpPr>
-          <p:cNvPr id="46" name="Straight Arrow Connector 45"/>
-          <p:cNvCxnSpPr>
-            <a:endCxn id="12" idx="0"/>
-          </p:cNvCxnSpPr>
-          <p:nvPr/>
-        </p:nvCxnSpPr>
-        <p:spPr>
-          <a:xfrm flipH="1">
-            <a:off x="2222517" y="750559"/>
-            <a:ext cx="838623" cy="538755"/>
-          </a:xfrm>
-          <a:prstGeom prst="straightConnector1">
-            <a:avLst/>
-          </a:prstGeom>
-          <a:ln w="3175" cmpd="sng">
-            <a:solidFill>
-              <a:schemeClr val="tx1"/>
-            </a:solidFill>
-            <a:headEnd type="none"/>
-            <a:tailEnd type="none"/>
-          </a:ln>
-        </p:spPr>
-        <p:style>
-          <a:lnRef idx="2">
-            <a:schemeClr val="accent1"/>
-          </a:lnRef>
-          <a:fillRef idx="0">
-            <a:schemeClr val="accent1"/>
-          </a:fillRef>
-          <a:effectRef idx="1">
-            <a:schemeClr val="accent1"/>
-          </a:effectRef>
-          <a:fontRef idx="minor">
-            <a:schemeClr val="tx1"/>
-          </a:fontRef>
-        </p:style>
-      </p:cxnSp>
-      <p:cxnSp>
-        <p:nvCxnSpPr>
-          <p:cNvPr id="49" name="Straight Arrow Connector 48"/>
-          <p:cNvCxnSpPr/>
-          <p:nvPr/>
-        </p:nvCxnSpPr>
-        <p:spPr>
-          <a:xfrm flipH="1">
-            <a:off x="2836333" y="750079"/>
-            <a:ext cx="233273" cy="511454"/>
-          </a:xfrm>
-          <a:prstGeom prst="straightConnector1">
-            <a:avLst/>
-          </a:prstGeom>
-          <a:ln w="3175" cmpd="sng">
-            <a:solidFill>
-              <a:schemeClr val="tx1"/>
-            </a:solidFill>
-            <a:headEnd type="none"/>
-            <a:tailEnd type="none"/>
-          </a:ln>
-        </p:spPr>
-        <p:style>
-          <a:lnRef idx="2">
-            <a:schemeClr val="accent1"/>
-          </a:lnRef>
-          <a:fillRef idx="0">
-            <a:schemeClr val="accent1"/>
-          </a:fillRef>
-          <a:effectRef idx="1">
-            <a:schemeClr val="accent1"/>
-          </a:effectRef>
-          <a:fontRef idx="minor">
-            <a:schemeClr val="tx1"/>
-          </a:fontRef>
-        </p:style>
-      </p:cxnSp>
-      <p:cxnSp>
-        <p:nvCxnSpPr>
-          <p:cNvPr id="50" name="Straight Arrow Connector 49"/>
-          <p:cNvCxnSpPr/>
-          <p:nvPr/>
-        </p:nvCxnSpPr>
-        <p:spPr>
-          <a:xfrm>
-            <a:off x="3063351" y="742071"/>
-            <a:ext cx="280982" cy="654929"/>
-          </a:xfrm>
-          <a:prstGeom prst="straightConnector1">
-            <a:avLst/>
-          </a:prstGeom>
-          <a:ln w="3175" cmpd="sng">
-            <a:solidFill>
-              <a:schemeClr val="tx1"/>
-            </a:solidFill>
-            <a:headEnd type="none"/>
-            <a:tailEnd type="none"/>
-          </a:ln>
-        </p:spPr>
-        <p:style>
-          <a:lnRef idx="2">
-            <a:schemeClr val="accent1"/>
-          </a:lnRef>
-          <a:fillRef idx="0">
-            <a:schemeClr val="accent1"/>
-          </a:fillRef>
-          <a:effectRef idx="1">
-            <a:schemeClr val="accent1"/>
-          </a:effectRef>
-          <a:fontRef idx="minor">
-            <a:schemeClr val="tx1"/>
-          </a:fontRef>
-        </p:style>
-      </p:cxnSp>
-      <p:sp>
-        <p:nvSpPr>
-          <p:cNvPr id="68" name="TextBox 67"/>
-          <p:cNvSpPr txBox="1"/>
-          <p:nvPr/>
-        </p:nvSpPr>
-        <p:spPr>
-          <a:xfrm>
-            <a:off x="69130" y="252740"/>
-            <a:ext cx="1983285" cy="707886"/>
-          </a:xfrm>
-          <a:prstGeom prst="rect">
-            <a:avLst/>
-          </a:prstGeom>
-          <a:noFill/>
-        </p:spPr>
-        <p:txBody>
-          <a:bodyPr wrap="none" rtlCol="0">
-            <a:spAutoFit/>
-          </a:bodyPr>
-          <a:lstStyle/>
-          <a:p>
-            <a:r>
-              <a:rPr lang="en-US" sz="1000" dirty="0" smtClean="0"/>
-              <a:t>Data used in 1998 by reference [6] </a:t>
-            </a:r>
-          </a:p>
-          <a:p>
-            <a:r>
-              <a:rPr lang="en-US" sz="1000" dirty="0"/>
-              <a:t>t</a:t>
-            </a:r>
-            <a:r>
-              <a:rPr lang="en-US" sz="1000" dirty="0" smtClean="0"/>
-              <a:t>o build the  standard </a:t>
-            </a:r>
-            <a:br>
-              <a:rPr lang="en-US" sz="1000" dirty="0" smtClean="0"/>
-            </a:br>
-            <a:r>
-              <a:rPr lang="en-US" sz="1000" dirty="0" smtClean="0"/>
-              <a:t>COCOMO </a:t>
-            </a:r>
-          </a:p>
-          <a:p>
-            <a:r>
-              <a:rPr lang="en-US" sz="1000" dirty="0" smtClean="0"/>
-              <a:t>model. </a:t>
-            </a:r>
-          </a:p>
-        </p:txBody>
-      </p:sp>
-      <p:cxnSp>
-        <p:nvCxnSpPr>
-          <p:cNvPr id="76" name="Straight Connector 75"/>
-          <p:cNvCxnSpPr/>
-          <p:nvPr/>
-        </p:nvCxnSpPr>
-        <p:spPr>
-          <a:xfrm flipV="1">
-            <a:off x="914400" y="1430867"/>
-            <a:ext cx="262467" cy="203201"/>
-          </a:xfrm>
-          <a:prstGeom prst="line">
-            <a:avLst/>
-          </a:prstGeom>
-          <a:ln w="3175" cmpd="sng">
-            <a:solidFill>
-              <a:schemeClr val="tx1"/>
-            </a:solidFill>
-            <a:headEnd type="none"/>
-            <a:tailEnd type="stealth"/>
-          </a:ln>
-        </p:spPr>
-        <p:style>
-          <a:lnRef idx="2">
-            <a:schemeClr val="accent1"/>
-          </a:lnRef>
-          <a:fillRef idx="0">
-            <a:schemeClr val="accent1"/>
-          </a:fillRef>
-          <a:effectRef idx="1">
-            <a:schemeClr val="accent1"/>
-          </a:effectRef>
-          <a:fontRef idx="minor">
-            <a:schemeClr val="tx1"/>
-          </a:fontRef>
-        </p:style>
-      </p:cxnSp>
-      <p:cxnSp>
-        <p:nvCxnSpPr>
-          <p:cNvPr id="82" name="Straight Arrow Connector 81"/>
-          <p:cNvCxnSpPr/>
-          <p:nvPr/>
-        </p:nvCxnSpPr>
-        <p:spPr>
-          <a:xfrm>
-            <a:off x="728134" y="685799"/>
-            <a:ext cx="499533" cy="203201"/>
-          </a:xfrm>
-          <a:prstGeom prst="straightConnector1">
-            <a:avLst/>
-          </a:prstGeom>
-          <a:ln w="3175" cmpd="sng">
-            <a:solidFill>
-              <a:schemeClr val="tx1"/>
-            </a:solidFill>
-            <a:headEnd type="none"/>
-            <a:tailEnd type="none"/>
+            <a:tailEnd type="triangle"/>
           </a:ln>
         </p:spPr>
         <p:style>

</xml_diff>